<commit_message>
updated contents, slides, review notes
</commit_message>
<xml_diff>
--- a/08_embedded_systems/ep1000_analogio.pptx
+++ b/08_embedded_systems/ep1000_analogio.pptx
@@ -202,7 +202,7 @@
           <a:p>
             <a:fld id="{2A875741-58CA-43A4-9946-B635E52C5CD8}" type="datetimeFigureOut">
               <a:rPr lang="en-US" smtClean="0"/>
-              <a:t>6/4/2021</a:t>
+              <a:t>5/5/2022</a:t>
             </a:fld>
             <a:endParaRPr lang="en-US"/>
           </a:p>
@@ -612,7 +612,7 @@
           <a:p>
             <a:fld id="{9665C769-D7C3-4E51-9622-EB882B1C6B88}" type="datetime1">
               <a:rPr lang="en-US" smtClean="0"/>
-              <a:t>6/4/2021</a:t>
+              <a:t>5/5/2022</a:t>
             </a:fld>
             <a:endParaRPr lang="en-US"/>
           </a:p>
@@ -806,7 +806,7 @@
           <a:p>
             <a:fld id="{AC2FA8F2-92AD-4DF3-BB80-1A576E4607C5}" type="datetime1">
               <a:rPr lang="en-US" smtClean="0"/>
-              <a:t>6/4/2021</a:t>
+              <a:t>5/5/2022</a:t>
             </a:fld>
             <a:endParaRPr lang="en-US"/>
           </a:p>
@@ -1005,7 +1005,7 @@
           <a:p>
             <a:fld id="{FF161318-0D48-4B52-BC2D-A0EA8E79725D}" type="datetime1">
               <a:rPr lang="en-US" smtClean="0"/>
-              <a:t>6/4/2021</a:t>
+              <a:t>5/5/2022</a:t>
             </a:fld>
             <a:endParaRPr lang="en-US"/>
           </a:p>
@@ -1199,7 +1199,7 @@
           <a:p>
             <a:fld id="{828929F4-2E32-48E9-8E95-ABAA8EAAF6A9}" type="datetime1">
               <a:rPr lang="en-US" smtClean="0"/>
-              <a:t>6/4/2021</a:t>
+              <a:t>5/5/2022</a:t>
             </a:fld>
             <a:endParaRPr lang="en-US"/>
           </a:p>
@@ -1462,7 +1462,7 @@
           <a:p>
             <a:fld id="{4D668969-C21F-428C-9E53-8D921FF4543A}" type="datetime1">
               <a:rPr lang="en-US" smtClean="0"/>
-              <a:t>6/4/2021</a:t>
+              <a:t>5/5/2022</a:t>
             </a:fld>
             <a:endParaRPr lang="en-US"/>
           </a:p>
@@ -1716,7 +1716,7 @@
           <a:p>
             <a:fld id="{01FB22A5-6159-4D69-BFEE-F4892803599C}" type="datetime1">
               <a:rPr lang="en-US" smtClean="0"/>
-              <a:t>6/4/2021</a:t>
+              <a:t>5/5/2022</a:t>
             </a:fld>
             <a:endParaRPr lang="en-US"/>
           </a:p>
@@ -2110,7 +2110,7 @@
           <a:p>
             <a:fld id="{738CC944-9765-440C-9A18-3DC1DA37440E}" type="datetime1">
               <a:rPr lang="en-US" smtClean="0"/>
-              <a:t>6/4/2021</a:t>
+              <a:t>5/5/2022</a:t>
             </a:fld>
             <a:endParaRPr lang="en-US"/>
           </a:p>
@@ -2244,7 +2244,7 @@
           <a:p>
             <a:fld id="{D8661C67-BB8E-4D16-A78D-460AAF94A53C}" type="datetime1">
               <a:rPr lang="en-US" smtClean="0"/>
-              <a:t>6/4/2021</a:t>
+              <a:t>5/5/2022</a:t>
             </a:fld>
             <a:endParaRPr lang="en-US"/>
           </a:p>
@@ -2355,7 +2355,7 @@
           <a:p>
             <a:fld id="{DBBC12E8-4105-456C-A90A-AF2362FB188F}" type="datetime1">
               <a:rPr lang="en-US" smtClean="0"/>
-              <a:t>6/4/2021</a:t>
+              <a:t>5/5/2022</a:t>
             </a:fld>
             <a:endParaRPr lang="en-US"/>
           </a:p>
@@ -2654,7 +2654,7 @@
           <a:p>
             <a:fld id="{11FD4DDA-56B2-4B92-884C-68E9C78E3003}" type="datetime1">
               <a:rPr lang="en-US" smtClean="0"/>
-              <a:t>6/4/2021</a:t>
+              <a:t>5/5/2022</a:t>
             </a:fld>
             <a:endParaRPr lang="en-US"/>
           </a:p>
@@ -2933,7 +2933,7 @@
           <a:p>
             <a:fld id="{750461B4-47C4-4F2C-98A2-225FD39D225C}" type="datetime1">
               <a:rPr lang="en-US" smtClean="0"/>
-              <a:t>6/4/2021</a:t>
+              <a:t>5/5/2022</a:t>
             </a:fld>
             <a:endParaRPr lang="en-US"/>
           </a:p>
@@ -3553,7 +3553,7 @@
           <a:p>
             <a:r>
               <a:rPr lang="en-US" dirty="0"/>
-              <a:t>Digital I/O</a:t>
+              <a:t>Analog I/O</a:t>
             </a:r>
             <a:endParaRPr lang="en-US" dirty="0">
               <a:solidFill>
@@ -5828,7 +5828,7 @@
           <a:p>
             <a:r>
               <a:rPr lang="en-US" dirty="0"/>
-              <a:t>Digital I/O</a:t>
+              <a:t>Analog I/O</a:t>
             </a:r>
           </a:p>
           <a:p>

</xml_diff>